<commit_message>
Linear Regression: A Practical Perspective
</commit_message>
<xml_diff>
--- a/LR Presentation.pptx
+++ b/LR Presentation.pptx
@@ -2850,7 +2850,7 @@
         </p:nvSpPr>
         <p:spPr>
           <a:xfrm>
-            <a:off x="381300" y="685800"/>
+            <a:off x="381000" y="685800"/>
             <a:ext cx="6096000" cy="3429000"/>
           </a:xfrm>
           <a:custGeom>
@@ -8146,7 +8146,7 @@
               <a:buNone/>
             </a:pPr>
             <a:r>
-              <a:rPr lang="en-GB" sz="3025" b="1">
+              <a:rPr lang="en-GB" sz="3025" b="1" dirty="0">
                 <a:highlight>
                   <a:schemeClr val="lt1"/>
                 </a:highlight>
@@ -8157,7 +8157,7 @@
               </a:rPr>
               <a:t>Linear Regression: A practical perspective</a:t>
             </a:r>
-            <a:endParaRPr sz="3025" b="1">
+            <a:endParaRPr sz="3025" b="1" dirty="0">
               <a:highlight>
                 <a:schemeClr val="lt1"/>
               </a:highlight>
@@ -13682,7 +13682,7 @@
         <p:spPr>
           <a:xfrm>
             <a:off x="287375" y="751150"/>
-            <a:ext cx="4686300" cy="2216400"/>
+            <a:ext cx="4686300" cy="2215961"/>
           </a:xfrm>
           <a:prstGeom prst="rect">
             <a:avLst/>
@@ -13709,7 +13709,7 @@
               <a:buAutoNum type="arabicPeriod"/>
             </a:pPr>
             <a:r>
-              <a:rPr lang="en-GB" sz="1200" b="1">
+              <a:rPr lang="en-GB" sz="1200" b="1" dirty="0">
                 <a:solidFill>
                   <a:schemeClr val="dk1"/>
                 </a:solidFill>
@@ -13720,7 +13720,7 @@
               <a:t>Linearity</a:t>
             </a:r>
             <a:r>
-              <a:rPr lang="en-GB" sz="1200">
+              <a:rPr lang="en-GB" sz="1200" dirty="0">
                 <a:solidFill>
                   <a:schemeClr val="dk1"/>
                 </a:solidFill>
@@ -13731,7 +13731,7 @@
               <a:t>:</a:t>
             </a:r>
             <a:r>
-              <a:rPr lang="en-GB" sz="1200">
+              <a:rPr lang="en-GB" sz="1200" dirty="0">
                 <a:solidFill>
                   <a:srgbClr val="374151"/>
                 </a:solidFill>
@@ -13741,7 +13741,18 @@
               </a:rPr>
               <a:t> The relationship between the independent and dependent variables is linear.</a:t>
             </a:r>
-            <a:endParaRPr sz="1200">
+          </a:p>
+          <a:p>
+            <a:pPr marL="152400" lvl="0" algn="l" rtl="0">
+              <a:spcBef>
+                <a:spcPts val="0"/>
+              </a:spcBef>
+              <a:spcAft>
+                <a:spcPts val="0"/>
+              </a:spcAft>
+              <a:buSzPts val="1200"/>
+            </a:pPr>
+            <a:endParaRPr lang="en-GB" sz="1200" dirty="0">
               <a:solidFill>
                 <a:srgbClr val="374151"/>
               </a:solidFill>
@@ -13751,25 +13762,6 @@
             </a:endParaRPr>
           </a:p>
           <a:p>
-            <a:pPr marL="457200" lvl="0" indent="0" algn="l" rtl="0">
-              <a:spcBef>
-                <a:spcPts val="0"/>
-              </a:spcBef>
-              <a:spcAft>
-                <a:spcPts val="0"/>
-              </a:spcAft>
-              <a:buNone/>
-            </a:pPr>
-            <a:endParaRPr sz="1200">
-              <a:solidFill>
-                <a:srgbClr val="374151"/>
-              </a:solidFill>
-              <a:highlight>
-                <a:schemeClr val="lt1"/>
-              </a:highlight>
-            </a:endParaRPr>
-          </a:p>
-          <a:p>
             <a:pPr marL="457200" lvl="0" indent="-304800" algn="l" rtl="0">
               <a:spcBef>
                 <a:spcPts val="0"/>
@@ -13777,14 +13769,12 @@
               <a:spcAft>
                 <a:spcPts val="0"/>
               </a:spcAft>
-              <a:buClr>
-                <a:srgbClr val="374151"/>
-              </a:buClr>
               <a:buSzPts val="1200"/>
-              <a:buAutoNum type="arabicPeriod"/>
+              <a:buFont typeface="+mj-lt"/>
+              <a:buAutoNum type="arabicPeriod" startAt="2"/>
             </a:pPr>
             <a:r>
-              <a:rPr lang="en-GB" sz="1200" b="1">
+              <a:rPr lang="en-GB" sz="1200" b="1" dirty="0">
                 <a:solidFill>
                   <a:schemeClr val="dk1"/>
                 </a:solidFill>
@@ -13795,7 +13785,7 @@
               <a:t>Independence:</a:t>
             </a:r>
             <a:r>
-              <a:rPr lang="en-GB" sz="1200">
+              <a:rPr lang="en-GB" sz="1200" dirty="0">
                 <a:solidFill>
                   <a:srgbClr val="374151"/>
                 </a:solidFill>
@@ -13805,7 +13795,20 @@
               </a:rPr>
               <a:t> Observations in the dataset are independent of each other.</a:t>
             </a:r>
-            <a:endParaRPr sz="1200">
+          </a:p>
+          <a:p>
+            <a:pPr marL="457200" lvl="0" indent="-304800" algn="l" rtl="0">
+              <a:spcBef>
+                <a:spcPts val="0"/>
+              </a:spcBef>
+              <a:spcAft>
+                <a:spcPts val="0"/>
+              </a:spcAft>
+              <a:buSzPts val="1200"/>
+              <a:buFont typeface="+mj-lt"/>
+              <a:buAutoNum type="arabicPeriod" startAt="2"/>
+            </a:pPr>
+            <a:endParaRPr lang="en-GB" sz="1200" dirty="0">
               <a:solidFill>
                 <a:srgbClr val="374151"/>
               </a:solidFill>
@@ -13815,25 +13818,6 @@
             </a:endParaRPr>
           </a:p>
           <a:p>
-            <a:pPr marL="457200" lvl="0" indent="0" algn="l" rtl="0">
-              <a:spcBef>
-                <a:spcPts val="0"/>
-              </a:spcBef>
-              <a:spcAft>
-                <a:spcPts val="0"/>
-              </a:spcAft>
-              <a:buNone/>
-            </a:pPr>
-            <a:endParaRPr sz="1200">
-              <a:solidFill>
-                <a:srgbClr val="374151"/>
-              </a:solidFill>
-              <a:highlight>
-                <a:schemeClr val="lt1"/>
-              </a:highlight>
-            </a:endParaRPr>
-          </a:p>
-          <a:p>
             <a:pPr marL="457200" lvl="0" indent="-304800" algn="l" rtl="0">
               <a:spcBef>
                 <a:spcPts val="0"/>
@@ -13845,10 +13829,10 @@
                 <a:srgbClr val="374151"/>
               </a:buClr>
               <a:buSzPts val="1200"/>
-              <a:buAutoNum type="arabicPeriod"/>
+              <a:buAutoNum type="arabicPeriod" startAt="2"/>
             </a:pPr>
             <a:r>
-              <a:rPr lang="en-GB" sz="1200" b="1">
+              <a:rPr lang="en-GB" sz="1200" b="1" dirty="0">
                 <a:solidFill>
                   <a:schemeClr val="dk1"/>
                 </a:solidFill>
@@ -13859,7 +13843,7 @@
               <a:t>Homoscedasticity:</a:t>
             </a:r>
             <a:r>
-              <a:rPr lang="en-GB" sz="1200">
+              <a:rPr lang="en-GB" sz="1200" dirty="0">
                 <a:solidFill>
                   <a:srgbClr val="374151"/>
                 </a:solidFill>
@@ -13869,7 +13853,22 @@
               </a:rPr>
               <a:t> The residuals (errors) have constant variance at every level of the independent variable(s).</a:t>
             </a:r>
-            <a:endParaRPr sz="1200">
+          </a:p>
+          <a:p>
+            <a:pPr marL="457200" lvl="0" indent="-304800" algn="l" rtl="0">
+              <a:spcBef>
+                <a:spcPts val="0"/>
+              </a:spcBef>
+              <a:spcAft>
+                <a:spcPts val="0"/>
+              </a:spcAft>
+              <a:buClr>
+                <a:srgbClr val="374151"/>
+              </a:buClr>
+              <a:buSzPts val="1200"/>
+              <a:buAutoNum type="arabicPeriod" startAt="2"/>
+            </a:pPr>
+            <a:endParaRPr lang="en-GB" sz="1200" dirty="0">
               <a:solidFill>
                 <a:srgbClr val="374151"/>
               </a:solidFill>
@@ -13879,25 +13878,6 @@
             </a:endParaRPr>
           </a:p>
           <a:p>
-            <a:pPr marL="457200" lvl="0" indent="0" algn="l" rtl="0">
-              <a:spcBef>
-                <a:spcPts val="0"/>
-              </a:spcBef>
-              <a:spcAft>
-                <a:spcPts val="0"/>
-              </a:spcAft>
-              <a:buNone/>
-            </a:pPr>
-            <a:endParaRPr sz="1200">
-              <a:solidFill>
-                <a:srgbClr val="374151"/>
-              </a:solidFill>
-              <a:highlight>
-                <a:schemeClr val="lt1"/>
-              </a:highlight>
-            </a:endParaRPr>
-          </a:p>
-          <a:p>
             <a:pPr marL="457200" lvl="0" indent="-304800" algn="l" rtl="0">
               <a:spcBef>
                 <a:spcPts val="0"/>
@@ -13909,10 +13889,10 @@
                 <a:srgbClr val="374151"/>
               </a:buClr>
               <a:buSzPts val="1200"/>
-              <a:buAutoNum type="arabicPeriod"/>
+              <a:buAutoNum type="arabicPeriod" startAt="2"/>
             </a:pPr>
             <a:r>
-              <a:rPr lang="en-GB" sz="1200" b="1">
+              <a:rPr lang="en-GB" sz="1200" b="1" dirty="0">
                 <a:solidFill>
                   <a:schemeClr val="dk1"/>
                 </a:solidFill>
@@ -13923,7 +13903,7 @@
               <a:t>Normality:</a:t>
             </a:r>
             <a:r>
-              <a:rPr lang="en-GB" sz="1200">
+              <a:rPr lang="en-GB" sz="1200" dirty="0">
                 <a:solidFill>
                   <a:srgbClr val="374151"/>
                 </a:solidFill>
@@ -13933,7 +13913,7 @@
               </a:rPr>
               <a:t> The residuals of the model are normally distributed.</a:t>
             </a:r>
-            <a:endParaRPr sz="1200">
+            <a:endParaRPr sz="1200" dirty="0">
               <a:solidFill>
                 <a:srgbClr val="374151"/>
               </a:solidFill>
@@ -14040,7 +14020,7 @@
               <a:buChar char="●"/>
             </a:pPr>
             <a:r>
-              <a:rPr lang="en-GB" sz="1200">
+              <a:rPr lang="en-GB" sz="1200" dirty="0">
                 <a:solidFill>
                   <a:srgbClr val="374151"/>
                 </a:solidFill>
@@ -14050,7 +14030,7 @@
               </a:rPr>
               <a:t>May oversimplify real-world complex relationships.</a:t>
             </a:r>
-            <a:endParaRPr sz="1200">
+            <a:endParaRPr sz="1200" dirty="0">
               <a:solidFill>
                 <a:srgbClr val="374151"/>
               </a:solidFill>
@@ -14077,7 +14057,7 @@
               <a:buChar char="●"/>
             </a:pPr>
             <a:r>
-              <a:rPr lang="en-GB" sz="1200">
+              <a:rPr lang="en-GB" sz="1200" dirty="0">
                 <a:solidFill>
                   <a:srgbClr val="374151"/>
                 </a:solidFill>
@@ -14087,7 +14067,7 @@
               </a:rPr>
               <a:t>Can be heavily influenced by outliers.</a:t>
             </a:r>
-            <a:endParaRPr sz="1200">
+            <a:endParaRPr sz="1200" dirty="0">
               <a:solidFill>
                 <a:srgbClr val="374151"/>
               </a:solidFill>
@@ -14114,7 +14094,7 @@
               <a:buChar char="●"/>
             </a:pPr>
             <a:r>
-              <a:rPr lang="en-GB" sz="1200">
+              <a:rPr lang="en-GB" sz="1200" dirty="0">
                 <a:solidFill>
                   <a:srgbClr val="374151"/>
                 </a:solidFill>
@@ -14124,7 +14104,7 @@
               </a:rPr>
               <a:t>Assumes a constant slope across independent variables.</a:t>
             </a:r>
-            <a:endParaRPr sz="1200">
+            <a:endParaRPr sz="1200" dirty="0">
               <a:solidFill>
                 <a:srgbClr val="374151"/>
               </a:solidFill>
@@ -14210,6 +14190,69 @@
               <a:t>5</a:t>
             </a:r>
             <a:endParaRPr sz="900" b="1"/>
+          </a:p>
+        </p:txBody>
+      </p:sp>
+      <p:sp>
+        <p:nvSpPr>
+          <p:cNvPr id="2" name="Google Shape;280;p33">
+            <a:extLst>
+              <a:ext uri="{FF2B5EF4-FFF2-40B4-BE49-F238E27FC236}">
+                <a16:creationId xmlns:a16="http://schemas.microsoft.com/office/drawing/2014/main" id="{725A145A-BEB0-32CA-A8EA-C34B01D61BB3}"/>
+              </a:ext>
+            </a:extLst>
+          </p:cNvPr>
+          <p:cNvSpPr txBox="1"/>
+          <p:nvPr/>
+        </p:nvSpPr>
+        <p:spPr>
+          <a:xfrm>
+            <a:off x="126450" y="4851000"/>
+            <a:ext cx="5883600" cy="400200"/>
+          </a:xfrm>
+          <a:prstGeom prst="rect">
+            <a:avLst/>
+          </a:prstGeom>
+          <a:noFill/>
+          <a:ln>
+            <a:noFill/>
+          </a:ln>
+        </p:spPr>
+        <p:txBody>
+          <a:bodyPr spcFirstLastPara="1" wrap="square" lIns="91425" tIns="91425" rIns="91425" bIns="91425" anchor="t" anchorCtr="0">
+            <a:spAutoFit/>
+          </a:bodyPr>
+          <a:lstStyle/>
+          <a:p>
+            <a:pPr marL="0" marR="0" lvl="0" indent="0" algn="l" rtl="0">
+              <a:lnSpc>
+                <a:spcPct val="100000"/>
+              </a:lnSpc>
+              <a:spcBef>
+                <a:spcPts val="0"/>
+              </a:spcBef>
+              <a:spcAft>
+                <a:spcPts val="0"/>
+              </a:spcAft>
+              <a:buNone/>
+            </a:pPr>
+            <a:r>
+              <a:rPr lang="en-GB" sz="700"/>
+              <a:t>Reference: https://en.m.wikipedia.org/wiki/File:UK_Income_by_Age_and_Gender.png</a:t>
+            </a:r>
+            <a:endParaRPr sz="700"/>
+          </a:p>
+          <a:p>
+            <a:pPr marL="0" lvl="0" indent="0" algn="l" rtl="0">
+              <a:spcBef>
+                <a:spcPts val="0"/>
+              </a:spcBef>
+              <a:spcAft>
+                <a:spcPts val="0"/>
+              </a:spcAft>
+              <a:buNone/>
+            </a:pPr>
+            <a:endParaRPr sz="700"/>
           </a:p>
         </p:txBody>
       </p:sp>

</xml_diff>